<commit_message>
Add bridge slide to pitch deck: "You Have Three Options"
Inserts a new slide 3 between problem framing and solution to
smooth the narrative transition. Updated both markdown and pptx.

Co-Authored-By: Claude Opus 4.6 <noreply@anthropic.com>
</commit_message>
<xml_diff>
--- a/docs/pitch-deck-dependency-trap.pptx
+++ b/docs/pitch-deck-dependency-trap.pptx
@@ -7,6 +7,7 @@
   <p:sldIdLst>
     <p:sldId id="256" r:id="rId7"/>
     <p:sldId id="257" r:id="rId8"/>
+    <p:sldId id="261" r:id="rId12"/>
     <p:sldId id="258" r:id="rId9"/>
     <p:sldId id="259" r:id="rId10"/>
     <p:sldId id="260" r:id="rId11"/>
@@ -5512,6 +5513,406 @@
               </a:rPr>
               <a:t>Next step:  2-week evaluation sprint.
 You bring models.  We bring the platform.</a:t>
+            </a:r>
+          </a:p>
+        </p:txBody>
+      </p:sp>
+    </p:spTree>
+  </p:cSld>
+  <p:clrMapOvr>
+    <a:masterClrMapping/>
+  </p:clrMapOvr>
+</p:sld>
+</file>
+
+<file path=ppt/slides/slide6.xml><?xml version="1.0" encoding="utf-8"?>
+<p:sld xmlns:a="http://schemas.openxmlformats.org/drawingml/2006/main" xmlns:p="http://schemas.openxmlformats.org/presentationml/2006/main" xmlns:r="http://schemas.openxmlformats.org/officeDocument/2006/relationships">
+  <p:cSld>
+    <p:bg>
+      <p:bgPr>
+        <a:solidFill>
+          <a:srgbClr val="2D2D2D"/>
+        </a:solidFill>
+        <a:effectLst/>
+      </p:bgPr>
+    </p:bg>
+    <p:spTree>
+      <p:nvGrpSpPr>
+        <p:cNvPr id="1" name=""/>
+        <p:cNvGrpSpPr/>
+        <p:nvPr/>
+      </p:nvGrpSpPr>
+      <p:grpSpPr/>
+      <p:sp>
+        <p:nvSpPr>
+          <p:cNvPr id="2" name="TextBox 1"/>
+          <p:cNvSpPr txBox="1"/>
+          <p:nvPr/>
+        </p:nvSpPr>
+        <p:spPr>
+          <a:xfrm>
+            <a:off x="914400" y="731520"/>
+            <a:ext cx="10058400" cy="914400"/>
+          </a:xfrm>
+          <a:prstGeom prst="rect">
+            <a:avLst/>
+          </a:prstGeom>
+          <a:noFill/>
+        </p:spPr>
+        <p:txBody>
+          <a:bodyPr wrap="square">
+            <a:spAutoFit/>
+          </a:bodyPr>
+          <a:lstStyle/>
+          <a:p>
+            <a:pPr algn="l"/>
+            <a:r>
+              <a:rPr sz="4400" b="1">
+                <a:solidFill>
+                  <a:srgbClr val="FFFFFF"/>
+                </a:solidFill>
+                <a:latin typeface="Calibri"/>
+              </a:rPr>
+              <a:t>YOU HAVE THREE OPTIONS</a:t>
+            </a:r>
+          </a:p>
+        </p:txBody>
+      </p:sp>
+      <p:sp>
+        <p:nvSpPr>
+          <p:cNvPr id="3" name="Rectangle 2"/>
+          <p:cNvSpPr/>
+          <p:nvPr/>
+        </p:nvSpPr>
+        <p:spPr>
+          <a:xfrm>
+            <a:off x="914400" y="1828800"/>
+            <a:ext cx="1828800" cy="38100"/>
+          </a:xfrm>
+          <a:prstGeom prst="rect">
+            <a:avLst/>
+          </a:prstGeom>
+          <a:solidFill>
+            <a:srgbClr val="E84D3D"/>
+          </a:solidFill>
+          <a:ln>
+            <a:noFill/>
+          </a:ln>
+        </p:spPr>
+        <p:style>
+          <a:lnRef idx="1">
+            <a:schemeClr val="accent1"/>
+          </a:lnRef>
+          <a:fillRef idx="3">
+            <a:schemeClr val="accent1"/>
+          </a:fillRef>
+          <a:effectRef idx="2">
+            <a:schemeClr val="accent1"/>
+          </a:effectRef>
+          <a:fontRef idx="minor">
+            <a:schemeClr val="lt1"/>
+          </a:fontRef>
+        </p:style>
+        <p:txBody>
+          <a:bodyPr rtlCol="0" anchor="ctr"/>
+          <a:lstStyle/>
+          <a:p>
+            <a:pPr algn="ctr"/>
+          </a:p>
+        </p:txBody>
+      </p:sp>
+      <p:sp>
+        <p:nvSpPr>
+          <p:cNvPr id="4" name="Rounded Rectangle 3"/>
+          <p:cNvSpPr/>
+          <p:nvPr/>
+        </p:nvSpPr>
+        <p:spPr>
+          <a:xfrm>
+            <a:off x="914400" y="2377440"/>
+            <a:ext cx="3017520" cy="2560320"/>
+          </a:xfrm>
+          <a:prstGeom prst="roundRect">
+            <a:avLst/>
+          </a:prstGeom>
+          <a:solidFill>
+            <a:srgbClr val="3A3A3A"/>
+          </a:solidFill>
+          <a:ln>
+            <a:noFill/>
+          </a:ln>
+        </p:spPr>
+        <p:style>
+          <a:lnRef idx="1">
+            <a:schemeClr val="accent1"/>
+          </a:lnRef>
+          <a:fillRef idx="3">
+            <a:schemeClr val="accent1"/>
+          </a:fillRef>
+          <a:effectRef idx="2">
+            <a:schemeClr val="accent1"/>
+          </a:effectRef>
+          <a:fontRef idx="minor">
+            <a:schemeClr val="lt1"/>
+          </a:fontRef>
+        </p:style>
+        <p:txBody>
+          <a:bodyPr rtlCol="0" anchor="ctr" wrap="square" lIns="228600" rIns="228600" tIns="228600" bIns="228600"/>
+          <a:lstStyle/>
+          <a:p>
+            <a:pPr algn="l"/>
+            <a:r>
+              <a:rPr sz="2800" b="1">
+                <a:solidFill>
+                  <a:srgbClr val="E84D3D"/>
+                </a:solidFill>
+                <a:latin typeface="Calibri"/>
+              </a:rPr>
+              <a:t>01</a:t>
+            </a:r>
+          </a:p>
+          <a:p>
+            <a:pPr algn="l">
+              <a:spcBef>
+                <a:spcPts val="1000"/>
+              </a:spcBef>
+            </a:pPr>
+            <a:r>
+              <a:rPr sz="2200" b="1">
+                <a:solidFill>
+                  <a:srgbClr val="FFFFFF"/>
+                </a:solidFill>
+                <a:latin typeface="Calibri"/>
+              </a:rPr>
+              <a:t>Wait for the roadmap</a:t>
+            </a:r>
+          </a:p>
+          <a:p>
+            <a:pPr algn="l">
+              <a:spcBef>
+                <a:spcPts val="1200"/>
+              </a:spcBef>
+            </a:pPr>
+            <a:r>
+              <a:rPr sz="1800" b="0">
+                <a:solidFill>
+                  <a:srgbClr val="CCCCCC"/>
+                </a:solidFill>
+                <a:latin typeface="Calibri"/>
+              </a:rPr>
+              <a:t>You ship when they ship. If they ship.</a:t>
+            </a:r>
+          </a:p>
+        </p:txBody>
+      </p:sp>
+      <p:sp>
+        <p:nvSpPr>
+          <p:cNvPr id="5" name="Rounded Rectangle 4"/>
+          <p:cNvSpPr/>
+          <p:nvPr/>
+        </p:nvSpPr>
+        <p:spPr>
+          <a:xfrm>
+            <a:off x="4389120" y="2377440"/>
+            <a:ext cx="3017520" cy="2560320"/>
+          </a:xfrm>
+          <a:prstGeom prst="roundRect">
+            <a:avLst/>
+          </a:prstGeom>
+          <a:solidFill>
+            <a:srgbClr val="3A3A3A"/>
+          </a:solidFill>
+          <a:ln>
+            <a:noFill/>
+          </a:ln>
+        </p:spPr>
+        <p:style>
+          <a:lnRef idx="1">
+            <a:schemeClr val="accent1"/>
+          </a:lnRef>
+          <a:fillRef idx="3">
+            <a:schemeClr val="accent1"/>
+          </a:fillRef>
+          <a:effectRef idx="2">
+            <a:schemeClr val="accent1"/>
+          </a:effectRef>
+          <a:fontRef idx="minor">
+            <a:schemeClr val="lt1"/>
+          </a:fontRef>
+        </p:style>
+        <p:txBody>
+          <a:bodyPr rtlCol="0" anchor="ctr" wrap="square" lIns="228600" rIns="228600" tIns="228600" bIns="228600"/>
+          <a:lstStyle/>
+          <a:p>
+            <a:pPr algn="l"/>
+            <a:r>
+              <a:rPr sz="2800" b="1">
+                <a:solidFill>
+                  <a:srgbClr val="E84D3D"/>
+                </a:solidFill>
+                <a:latin typeface="Calibri"/>
+              </a:rPr>
+              <a:t>02</a:t>
+            </a:r>
+          </a:p>
+          <a:p>
+            <a:pPr algn="l">
+              <a:spcBef>
+                <a:spcPts val="1000"/>
+              </a:spcBef>
+            </a:pPr>
+            <a:r>
+              <a:rPr sz="2200" b="1">
+                <a:solidFill>
+                  <a:srgbClr val="FFFFFF"/>
+                </a:solidFill>
+                <a:latin typeface="Calibri"/>
+              </a:rPr>
+              <a:t>Throw money at it</a:t>
+            </a:r>
+          </a:p>
+          <a:p>
+            <a:pPr algn="l">
+              <a:spcBef>
+                <a:spcPts val="1200"/>
+              </a:spcBef>
+            </a:pPr>
+            <a:r>
+              <a:rPr sz="1800" b="0">
+                <a:solidFill>
+                  <a:srgbClr val="CCCCCC"/>
+                </a:solidFill>
+                <a:latin typeface="Calibri"/>
+              </a:rPr>
+              <a:t>Overpay today, repeat next generation.</a:t>
+            </a:r>
+          </a:p>
+        </p:txBody>
+      </p:sp>
+      <p:sp>
+        <p:nvSpPr>
+          <p:cNvPr id="6" name="Rounded Rectangle 5"/>
+          <p:cNvSpPr/>
+          <p:nvPr/>
+        </p:nvSpPr>
+        <p:spPr>
+          <a:xfrm>
+            <a:off x="7863840" y="2377440"/>
+            <a:ext cx="3017520" cy="2560320"/>
+          </a:xfrm>
+          <a:prstGeom prst="roundRect">
+            <a:avLst/>
+          </a:prstGeom>
+          <a:solidFill>
+            <a:srgbClr val="2A4A2A"/>
+          </a:solidFill>
+          <a:ln>
+            <a:noFill/>
+          </a:ln>
+        </p:spPr>
+        <p:style>
+          <a:lnRef idx="1">
+            <a:schemeClr val="accent1"/>
+          </a:lnRef>
+          <a:fillRef idx="3">
+            <a:schemeClr val="accent1"/>
+          </a:fillRef>
+          <a:effectRef idx="2">
+            <a:schemeClr val="accent1"/>
+          </a:effectRef>
+          <a:fontRef idx="minor">
+            <a:schemeClr val="lt1"/>
+          </a:fontRef>
+        </p:style>
+        <p:txBody>
+          <a:bodyPr rtlCol="0" anchor="ctr" wrap="square" lIns="228600" rIns="228600" tIns="228600" bIns="228600"/>
+          <a:lstStyle/>
+          <a:p>
+            <a:pPr algn="l"/>
+            <a:r>
+              <a:rPr sz="2800" b="1">
+                <a:solidFill>
+                  <a:srgbClr val="3D9BE9"/>
+                </a:solidFill>
+                <a:latin typeface="Calibri"/>
+              </a:rPr>
+              <a:t>03</a:t>
+            </a:r>
+          </a:p>
+          <a:p>
+            <a:pPr algn="l">
+              <a:spcBef>
+                <a:spcPts val="1000"/>
+              </a:spcBef>
+            </a:pPr>
+            <a:r>
+              <a:rPr sz="2200" b="1">
+                <a:solidFill>
+                  <a:srgbClr val="FFFFFF"/>
+                </a:solidFill>
+                <a:latin typeface="Calibri"/>
+              </a:rPr>
+              <a:t>Design your own compute</a:t>
+            </a:r>
+          </a:p>
+          <a:p>
+            <a:pPr algn="l">
+              <a:spcBef>
+                <a:spcPts val="1200"/>
+              </a:spcBef>
+            </a:pPr>
+            <a:r>
+              <a:rPr sz="1800" b="0">
+                <a:solidFill>
+                  <a:srgbClr val="CCCCCC"/>
+                </a:solidFill>
+                <a:latin typeface="Calibri"/>
+              </a:rPr>
+              <a:t>Match silicon to mission, own the trajectory.</a:t>
+            </a:r>
+          </a:p>
+        </p:txBody>
+      </p:sp>
+      <p:sp>
+        <p:nvSpPr>
+          <p:cNvPr id="7" name="TextBox 6"/>
+          <p:cNvSpPr txBox="1"/>
+          <p:nvPr/>
+        </p:nvSpPr>
+        <p:spPr>
+          <a:xfrm>
+            <a:off x="914400" y="5394960"/>
+            <a:ext cx="10058400" cy="914400"/>
+          </a:xfrm>
+          <a:prstGeom prst="rect">
+            <a:avLst/>
+          </a:prstGeom>
+          <a:noFill/>
+        </p:spPr>
+        <p:txBody>
+          <a:bodyPr wrap="square">
+            <a:spAutoFit/>
+          </a:bodyPr>
+          <a:lstStyle/>
+          <a:p>
+            <a:pPr algn="l"/>
+            <a:r>
+              <a:rPr sz="2200" b="0">
+                <a:solidFill>
+                  <a:srgbClr val="888899"/>
+                </a:solidFill>
+                <a:latin typeface="Calibri"/>
+              </a:rPr>
+              <a:t>Option 3 used to take 50 engineers and 18 months.  </a:t>
+            </a:r>
+            <a:r>
+              <a:rPr sz="2200" b="1">
+                <a:solidFill>
+                  <a:srgbClr val="FFFFFF"/>
+                </a:solidFill>
+                <a:latin typeface="Calibri"/>
+              </a:rPr>
+              <a:t>It doesn't anymore.</a:t>
             </a:r>
           </a:p>
         </p:txBody>

</xml_diff>